<commit_message>
new codes + HW4 + lecture notes added
</commit_message>
<xml_diff>
--- a/Lecture Notes-Slides/Lecture 12.pptx
+++ b/Lecture Notes-Slides/Lecture 12.pptx
@@ -4034,6 +4034,10 @@
           <a:bodyPr/>
           <a:lstStyle/>
           <a:p>
+            <a:r>
+              <a:rPr lang="en-US" smtClean="0"/>
+              <a:t>`</a:t>
+            </a:r>
             <a:endParaRPr lang="en-US"/>
           </a:p>
         </p:txBody>
@@ -5371,6 +5375,13 @@
   <p:clrMapOvr>
     <a:masterClrMapping/>
   </p:clrMapOvr>
+  <p:timing>
+    <p:tnLst>
+      <p:par>
+        <p:cTn xmlns:p14="http://schemas.microsoft.com/office/powerpoint/2010/main" id="1" dur="indefinite" restart="never" nodeType="tmRoot"/>
+      </p:par>
+    </p:tnLst>
+  </p:timing>
 </p:sld>
 </file>
 
@@ -5647,6 +5658,13 @@
   <p:clrMapOvr>
     <a:masterClrMapping/>
   </p:clrMapOvr>
+  <p:timing>
+    <p:tnLst>
+      <p:par>
+        <p:cTn xmlns:p14="http://schemas.microsoft.com/office/powerpoint/2010/main" id="1" dur="indefinite" restart="never" nodeType="tmRoot"/>
+      </p:par>
+    </p:tnLst>
+  </p:timing>
 </p:sld>
 </file>
 

</xml_diff>